<commit_message>
feat(slide): new version with structured functions and new slides
</commit_message>
<xml_diff>
--- a/data_viz/prison_data_project/25_12_26_prisons_statistics.pptx
+++ b/data_viz/prison_data_project/25_12_26_prisons_statistics.pptx
@@ -5,7 +5,7 @@
     <p:sldMasterId id="2147483667" r:id="rId1"/>
   </p:sldMasterIdLst>
   <p:notesMasterIdLst>
-    <p:notesMasterId r:id="rId18"/>
+    <p:notesMasterId r:id="rId19"/>
   </p:notesMasterIdLst>
   <p:sldIdLst>
     <p:sldId id="258" r:id="rId2"/>
@@ -20,26 +20,27 @@
     <p:sldId id="276" r:id="rId11"/>
     <p:sldId id="268" r:id="rId12"/>
     <p:sldId id="279" r:id="rId13"/>
-    <p:sldId id="278" r:id="rId14"/>
-    <p:sldId id="269" r:id="rId15"/>
-    <p:sldId id="277" r:id="rId16"/>
-    <p:sldId id="271" r:id="rId17"/>
+    <p:sldId id="280" r:id="rId14"/>
+    <p:sldId id="281" r:id="rId15"/>
+    <p:sldId id="269" r:id="rId16"/>
+    <p:sldId id="277" r:id="rId17"/>
+    <p:sldId id="271" r:id="rId18"/>
   </p:sldIdLst>
   <p:sldSz cx="9144000" cy="5143500" type="screen16x9"/>
   <p:notesSz cx="6858000" cy="9144000"/>
   <p:embeddedFontLst>
     <p:embeddedFont>
       <p:font typeface="Lekton" panose="020B0604020202020204" charset="0"/>
-      <p:regular r:id="rId19"/>
-      <p:bold r:id="rId20"/>
-      <p:italic r:id="rId21"/>
+      <p:regular r:id="rId20"/>
+      <p:bold r:id="rId21"/>
+      <p:italic r:id="rId22"/>
     </p:embeddedFont>
     <p:embeddedFont>
       <p:font typeface="Titillium Web" panose="020B0604020202020204" charset="0"/>
-      <p:regular r:id="rId22"/>
-      <p:bold r:id="rId23"/>
-      <p:italic r:id="rId24"/>
-      <p:boldItalic r:id="rId25"/>
+      <p:regular r:id="rId23"/>
+      <p:bold r:id="rId24"/>
+      <p:italic r:id="rId25"/>
+      <p:boldItalic r:id="rId26"/>
     </p:embeddedFont>
   </p:embeddedFontLst>
   <p:defaultTextStyle>
@@ -1220,7 +1221,7 @@
   <p:cSld>
     <p:spTree>
       <p:nvGrpSpPr>
-        <p:cNvPr id="1" name="Shape 171"/>
+        <p:cNvPr id="1" name="Shape 176"/>
         <p:cNvGrpSpPr/>
         <p:nvPr/>
       </p:nvGrpSpPr>
@@ -1234,7 +1235,7 @@
       </p:grpSpPr>
       <p:sp>
         <p:nvSpPr>
-          <p:cNvPr id="172" name="Google Shape;172;g408aeda40d_0_62:notes"/>
+          <p:cNvPr id="177" name="Google Shape;177;g408aeda40d_0_88:notes"/>
           <p:cNvSpPr>
             <a:spLocks noGrp="1" noRot="1" noChangeAspect="1"/>
           </p:cNvSpPr>
@@ -1275,7 +1276,7 @@
       </p:sp>
       <p:sp>
         <p:nvSpPr>
-          <p:cNvPr id="173" name="Google Shape;173;g408aeda40d_0_62:notes"/>
+          <p:cNvPr id="178" name="Google Shape;178;g408aeda40d_0_88:notes"/>
           <p:cNvSpPr txBox="1">
             <a:spLocks noGrp="1"/>
           </p:cNvSpPr>
@@ -1314,7 +1315,7 @@
     </p:spTree>
     <p:extLst>
       <p:ext uri="{BB962C8B-B14F-4D97-AF65-F5344CB8AC3E}">
-        <p14:creationId xmlns:p14="http://schemas.microsoft.com/office/powerpoint/2010/main" val="2946637679"/>
+        <p14:creationId xmlns:p14="http://schemas.microsoft.com/office/powerpoint/2010/main" val="1764407715"/>
       </p:ext>
     </p:extLst>
   </p:cSld>
@@ -1421,6 +1422,11 @@
         </p:txBody>
       </p:sp>
     </p:spTree>
+    <p:extLst>
+      <p:ext uri="{BB962C8B-B14F-4D97-AF65-F5344CB8AC3E}">
+        <p14:creationId xmlns:p14="http://schemas.microsoft.com/office/powerpoint/2010/main" val="2917528745"/>
+      </p:ext>
+    </p:extLst>
   </p:cSld>
   <p:clrMapOvr>
     <a:masterClrMapping/>
@@ -1429,6 +1435,110 @@
 </file>
 
 <file path=ppt/notesSlides/notesSlide15.xml><?xml version="1.0" encoding="utf-8"?>
+<p:notes xmlns:a="http://schemas.openxmlformats.org/drawingml/2006/main" xmlns:r="http://schemas.openxmlformats.org/officeDocument/2006/relationships" xmlns:p="http://schemas.openxmlformats.org/presentationml/2006/main" showMasterSp="0" showMasterPhAnim="0">
+  <p:cSld>
+    <p:spTree>
+      <p:nvGrpSpPr>
+        <p:cNvPr id="1" name="Shape 176"/>
+        <p:cNvGrpSpPr/>
+        <p:nvPr/>
+      </p:nvGrpSpPr>
+      <p:grpSpPr>
+        <a:xfrm>
+          <a:off x="0" y="0"/>
+          <a:ext cx="0" cy="0"/>
+          <a:chOff x="0" y="0"/>
+          <a:chExt cx="0" cy="0"/>
+        </a:xfrm>
+      </p:grpSpPr>
+      <p:sp>
+        <p:nvSpPr>
+          <p:cNvPr id="177" name="Google Shape;177;g408aeda40d_0_88:notes"/>
+          <p:cNvSpPr>
+            <a:spLocks noGrp="1" noRot="1" noChangeAspect="1"/>
+          </p:cNvSpPr>
+          <p:nvPr>
+            <p:ph type="sldImg" idx="2"/>
+          </p:nvPr>
+        </p:nvSpPr>
+        <p:spPr>
+          <a:xfrm>
+            <a:off x="381000" y="685800"/>
+            <a:ext cx="6096000" cy="3429000"/>
+          </a:xfrm>
+          <a:custGeom>
+            <a:avLst/>
+            <a:gdLst/>
+            <a:ahLst/>
+            <a:cxnLst/>
+            <a:rect l="l" t="t" r="r" b="b"/>
+            <a:pathLst>
+              <a:path w="120000" h="120000" extrusionOk="0">
+                <a:moveTo>
+                  <a:pt x="0" y="0"/>
+                </a:moveTo>
+                <a:lnTo>
+                  <a:pt x="120000" y="0"/>
+                </a:lnTo>
+                <a:lnTo>
+                  <a:pt x="120000" y="120000"/>
+                </a:lnTo>
+                <a:lnTo>
+                  <a:pt x="0" y="120000"/>
+                </a:lnTo>
+                <a:close/>
+              </a:path>
+            </a:pathLst>
+          </a:custGeom>
+        </p:spPr>
+      </p:sp>
+      <p:sp>
+        <p:nvSpPr>
+          <p:cNvPr id="178" name="Google Shape;178;g408aeda40d_0_88:notes"/>
+          <p:cNvSpPr txBox="1">
+            <a:spLocks noGrp="1"/>
+          </p:cNvSpPr>
+          <p:nvPr>
+            <p:ph type="body" idx="1"/>
+          </p:nvPr>
+        </p:nvSpPr>
+        <p:spPr>
+          <a:xfrm>
+            <a:off x="685800" y="4343400"/>
+            <a:ext cx="5486400" cy="4114800"/>
+          </a:xfrm>
+          <a:prstGeom prst="rect">
+            <a:avLst/>
+          </a:prstGeom>
+        </p:spPr>
+        <p:txBody>
+          <a:bodyPr spcFirstLastPara="1" wrap="square" lIns="91425" tIns="91425" rIns="91425" bIns="91425" anchor="t" anchorCtr="0">
+            <a:noAutofit/>
+          </a:bodyPr>
+          <a:lstStyle/>
+          <a:p>
+            <a:pPr marL="0" lvl="0" indent="0" algn="l" rtl="0">
+              <a:spcBef>
+                <a:spcPts val="0"/>
+              </a:spcBef>
+              <a:spcAft>
+                <a:spcPts val="0"/>
+              </a:spcAft>
+              <a:buNone/>
+            </a:pPr>
+            <a:endParaRPr/>
+          </a:p>
+        </p:txBody>
+      </p:sp>
+    </p:spTree>
+  </p:cSld>
+  <p:clrMapOvr>
+    <a:masterClrMapping/>
+  </p:clrMapOvr>
+</p:notes>
+</file>
+
+<file path=ppt/notesSlides/notesSlide16.xml><?xml version="1.0" encoding="utf-8"?>
 <p:notes xmlns:a="http://schemas.openxmlformats.org/drawingml/2006/main" xmlns:r="http://schemas.openxmlformats.org/officeDocument/2006/relationships" xmlns:p="http://schemas.openxmlformats.org/presentationml/2006/main" showMasterSp="0" showMasterPhAnim="0">
   <p:cSld>
     <p:spTree>
@@ -1555,7 +1665,7 @@
 </p:notes>
 </file>
 
-<file path=ppt/notesSlides/notesSlide16.xml><?xml version="1.0" encoding="utf-8"?>
+<file path=ppt/notesSlides/notesSlide17.xml><?xml version="1.0" encoding="utf-8"?>
 <p:notes xmlns:a="http://schemas.openxmlformats.org/drawingml/2006/main" xmlns:r="http://schemas.openxmlformats.org/officeDocument/2006/relationships" xmlns:p="http://schemas.openxmlformats.org/presentationml/2006/main" showMasterSp="0" showMasterPhAnim="0">
   <p:cSld>
     <p:spTree>
@@ -14210,7 +14320,7 @@
   <p:cSld>
     <p:spTree>
       <p:nvGrpSpPr>
-        <p:cNvPr id="1" name="Shape 174"/>
+        <p:cNvPr id="1" name="Shape 179"/>
         <p:cNvGrpSpPr/>
         <p:nvPr/>
       </p:nvGrpSpPr>
@@ -14224,14 +14334,14 @@
       </p:grpSpPr>
       <p:sp>
         <p:nvSpPr>
-          <p:cNvPr id="175" name="Google Shape;175;p33"/>
+          <p:cNvPr id="180" name="Google Shape;180;p34"/>
           <p:cNvSpPr txBox="1"/>
           <p:nvPr/>
         </p:nvSpPr>
         <p:spPr>
           <a:xfrm>
-            <a:off x="5356800" y="75350"/>
-            <a:ext cx="3126600" cy="476100"/>
+            <a:off x="567000" y="111350"/>
+            <a:ext cx="8010000" cy="476100"/>
           </a:xfrm>
           <a:prstGeom prst="rect">
             <a:avLst/>
@@ -14247,14 +14357,14 @@
           </a:bodyPr>
           <a:lstStyle/>
           <a:p>
-            <a:pPr marL="0" lvl="0" indent="0" algn="ctr" rtl="0">
+            <a:pPr lvl="0" algn="ctr">
               <a:spcBef>
                 <a:spcPts val="1000"/>
               </a:spcBef>
-              <a:spcAft>
-                <a:spcPts val="0"/>
-              </a:spcAft>
-              <a:buNone/>
+              <a:buClr>
+                <a:schemeClr val="dk1"/>
+              </a:buClr>
+              <a:buSzPts val="1100"/>
             </a:pPr>
             <a:r>
               <a:rPr lang="en-US" sz="1800" b="1" dirty="0">
@@ -14266,50 +14376,17 @@
                 <a:cs typeface="Lekton"/>
                 <a:sym typeface="Lekton"/>
               </a:rPr>
-              <a:t>EUROPEAN PRISON OVERCROWDING MAP (</a:t>
-            </a:r>
-            <a:r>
-              <a:rPr lang="en-US" sz="1800" b="1" dirty="0" err="1">
-                <a:solidFill>
-                  <a:srgbClr val="D66B55"/>
-                </a:solidFill>
-                <a:latin typeface="Lekton"/>
-                <a:ea typeface="Lekton"/>
-                <a:cs typeface="Lekton"/>
-                <a:sym typeface="Lekton"/>
-              </a:rPr>
-              <a:t>DataWrapper</a:t>
-            </a:r>
-            <a:r>
-              <a:rPr lang="en-US" sz="1800" b="1" dirty="0">
-                <a:solidFill>
-                  <a:srgbClr val="D66B55"/>
-                </a:solidFill>
-                <a:latin typeface="Lekton"/>
-                <a:ea typeface="Lekton"/>
-                <a:cs typeface="Lekton"/>
-                <a:sym typeface="Lekton"/>
-              </a:rPr>
-              <a:t> Choropleth)</a:t>
-            </a:r>
-            <a:endParaRPr i="1" dirty="0">
-              <a:solidFill>
-                <a:srgbClr val="333333"/>
-              </a:solidFill>
-              <a:latin typeface="Lekton"/>
-              <a:ea typeface="Lekton"/>
-              <a:cs typeface="Lekton"/>
-              <a:sym typeface="Lekton"/>
-            </a:endParaRPr>
+              <a:t>European countries have been most successful in maintained occupancy rates below capacity in the 2022</a:t>
+            </a:r>
           </a:p>
         </p:txBody>
       </p:sp>
       <p:sp>
         <p:nvSpPr>
-          <p:cNvPr id="5" name="TextBox 4">
+          <p:cNvPr id="8" name="TextBox 7">
             <a:extLst>
               <a:ext uri="{FF2B5EF4-FFF2-40B4-BE49-F238E27FC236}">
-                <a16:creationId xmlns:a16="http://schemas.microsoft.com/office/drawing/2014/main" id="{7CE32C00-CB1F-6C74-C042-647A29556A18}"/>
+                <a16:creationId xmlns:a16="http://schemas.microsoft.com/office/drawing/2014/main" id="{4B15ACC2-9BD0-A397-E2B5-AA9B98489E73}"/>
               </a:ext>
             </a:extLst>
           </p:cNvPr>
@@ -14318,8 +14395,8 @@
         </p:nvSpPr>
         <p:spPr>
           <a:xfrm>
-            <a:off x="4998386" y="1204998"/>
-            <a:ext cx="4145614" cy="3816429"/>
+            <a:off x="4572000" y="1171539"/>
+            <a:ext cx="4630421" cy="3631763"/>
           </a:xfrm>
           <a:prstGeom prst="rect">
             <a:avLst/>
@@ -14336,13 +14413,13 @@
               <a:buNone/>
             </a:pPr>
             <a:r>
-              <a:rPr lang="en-US" sz="1100" dirty="0">
-                <a:solidFill>
-                  <a:srgbClr val="333333"/>
-                </a:solidFill>
-                <a:latin typeface="Lekton"/>
-              </a:rPr>
-              <a:t>Interactive choropleth map of Europe showing prison occupancy rates by country in 2023.</a:t>
+              <a:rPr lang="en-US" sz="1000" dirty="0">
+                <a:solidFill>
+                  <a:srgbClr val="333333"/>
+                </a:solidFill>
+                <a:latin typeface="Lekton"/>
+              </a:rPr>
+              <a:t>Visual Description</a:t>
             </a:r>
           </a:p>
           <a:p>
@@ -14350,159 +14427,69 @@
               <a:buNone/>
             </a:pPr>
             <a:r>
-              <a:rPr lang="en-US" sz="1100" dirty="0">
-                <a:solidFill>
-                  <a:srgbClr val="333333"/>
-                </a:solidFill>
-                <a:latin typeface="Lekton"/>
-              </a:rPr>
-              <a:t>Color scheme:</a:t>
-            </a:r>
-          </a:p>
-          <a:p>
-            <a:pPr algn="l"/>
-            <a:r>
-              <a:rPr lang="en-US" sz="1100" dirty="0">
-                <a:solidFill>
-                  <a:srgbClr val="333333"/>
-                </a:solidFill>
-                <a:latin typeface="Lekton"/>
-              </a:rPr>
-              <a:t>Green: &lt;90% (good, below capacity)</a:t>
-            </a:r>
-          </a:p>
-          <a:p>
-            <a:pPr algn="l"/>
-            <a:r>
-              <a:rPr lang="en-US" sz="1100" dirty="0">
-                <a:solidFill>
-                  <a:srgbClr val="333333"/>
-                </a:solidFill>
-                <a:latin typeface="Lekton"/>
-              </a:rPr>
-              <a:t>Yellow: 90–100% (acceptable, at capacity)</a:t>
-            </a:r>
-          </a:p>
-          <a:p>
-            <a:pPr algn="l"/>
-            <a:r>
-              <a:rPr lang="en-US" sz="1100" dirty="0">
-                <a:solidFill>
-                  <a:srgbClr val="333333"/>
-                </a:solidFill>
-                <a:latin typeface="Lekton"/>
-              </a:rPr>
-              <a:t>Orange: 100–120% (overcrowded, critical)</a:t>
-            </a:r>
-          </a:p>
-          <a:p>
-            <a:pPr algn="l"/>
-            <a:r>
-              <a:rPr lang="en-US" sz="1100" dirty="0">
-                <a:solidFill>
-                  <a:srgbClr val="333333"/>
-                </a:solidFill>
-                <a:latin typeface="Lekton"/>
-              </a:rPr>
-              <a:t>Red: &gt;120% (severe overcrowding, emergency)</a:t>
+              <a:rPr lang="en-US" sz="1000" dirty="0">
+                <a:solidFill>
+                  <a:srgbClr val="333333"/>
+                </a:solidFill>
+                <a:latin typeface="Lekton"/>
+              </a:rPr>
+              <a:t>Time series line chart (2014–2023) showing occupancy rate evolution for:</a:t>
             </a:r>
           </a:p>
           <a:p>
             <a:pPr algn="l">
               <a:buNone/>
             </a:pPr>
-            <a:endParaRPr lang="en-US" sz="1100" dirty="0">
-              <a:solidFill>
-                <a:srgbClr val="333333"/>
-              </a:solidFill>
-              <a:latin typeface="Lekton"/>
-            </a:endParaRPr>
+            <a:r>
+              <a:rPr lang="en-US" sz="1000" dirty="0">
+                <a:solidFill>
+                  <a:srgbClr val="333333"/>
+                </a:solidFill>
+                <a:latin typeface="Lekton"/>
+              </a:rPr>
+              <a:t>Italy, France, Belgium, Liechtenstein, Sweden</a:t>
+            </a:r>
           </a:p>
           <a:p>
             <a:pPr algn="l">
               <a:buNone/>
             </a:pPr>
             <a:r>
-              <a:rPr lang="en-US" sz="1100" dirty="0">
-                <a:solidFill>
-                  <a:srgbClr val="333333"/>
-                </a:solidFill>
-                <a:latin typeface="Lekton"/>
-              </a:rPr>
-              <a:t>What the map shows</a:t>
-            </a:r>
-          </a:p>
-          <a:p>
-            <a:pPr algn="l"/>
-            <a:r>
-              <a:rPr lang="en-US" sz="1100" dirty="0">
-                <a:solidFill>
-                  <a:srgbClr val="333333"/>
-                </a:solidFill>
-                <a:latin typeface="Lekton"/>
-              </a:rPr>
-              <a:t>13 countries highlighted in orange/red: Exceeding 100% capacity</a:t>
-            </a:r>
-          </a:p>
-          <a:p>
-            <a:pPr algn="l"/>
-            <a:r>
-              <a:rPr lang="en-US" sz="1100" dirty="0">
-                <a:solidFill>
-                  <a:srgbClr val="333333"/>
-                </a:solidFill>
-                <a:latin typeface="Lekton"/>
-              </a:rPr>
-              <a:t>Top 3 worst: Liechtenstein (218%), France (123%), Italy (119%)</a:t>
-            </a:r>
-          </a:p>
-          <a:p>
-            <a:pPr algn="l"/>
-            <a:r>
-              <a:rPr lang="en-US" sz="1100" dirty="0">
-                <a:solidFill>
-                  <a:srgbClr val="333333"/>
-                </a:solidFill>
-                <a:latin typeface="Lekton"/>
-              </a:rPr>
-              <a:t>EU27 average: 95.7% (shown as reference)</a:t>
-            </a:r>
-          </a:p>
-          <a:p>
-            <a:pPr algn="l"/>
-            <a:r>
-              <a:rPr lang="en-US" sz="1100" dirty="0">
-                <a:solidFill>
-                  <a:srgbClr val="333333"/>
-                </a:solidFill>
-                <a:latin typeface="Lekton"/>
-              </a:rPr>
-              <a:t>Best performers: Norway, Iceland, Finland, Ireland (65–80%)</a:t>
+              <a:rPr lang="en-US" sz="1000" dirty="0">
+                <a:solidFill>
+                  <a:srgbClr val="333333"/>
+                </a:solidFill>
+                <a:latin typeface="Lekton"/>
+              </a:rPr>
+              <a:t>EU27 average (reference baseline)</a:t>
             </a:r>
           </a:p>
           <a:p>
             <a:pPr algn="l">
               <a:buNone/>
             </a:pPr>
-            <a:endParaRPr lang="en-US" sz="1100" dirty="0">
-              <a:solidFill>
-                <a:srgbClr val="333333"/>
-              </a:solidFill>
-              <a:latin typeface="Lekton"/>
-            </a:endParaRPr>
+            <a:r>
+              <a:rPr lang="en-US" sz="1000" dirty="0">
+                <a:solidFill>
+                  <a:srgbClr val="333333"/>
+                </a:solidFill>
+                <a:latin typeface="Lekton"/>
+              </a:rPr>
+              <a:t>Red dashed line at 100%: overcrowding threshold</a:t>
+            </a:r>
           </a:p>
           <a:p>
             <a:pPr algn="l">
               <a:buNone/>
             </a:pPr>
             <a:r>
-              <a:rPr lang="en-US" sz="1100" dirty="0">
-                <a:solidFill>
-                  <a:srgbClr val="333333"/>
-                </a:solidFill>
-                <a:latin typeface="Lekton"/>
-              </a:rPr>
-              <a:t>Key insight</a:t>
+              <a:rPr lang="en-US" sz="1000" dirty="0">
+                <a:solidFill>
+                  <a:srgbClr val="333333"/>
+                </a:solidFill>
+                <a:latin typeface="Lekton"/>
+              </a:rPr>
+              <a:t>What the chart shows</a:t>
             </a:r>
           </a:p>
           <a:p>
@@ -14510,144 +14497,161 @@
               <a:buNone/>
             </a:pPr>
             <a:r>
-              <a:rPr lang="en-US" sz="1100" dirty="0">
-                <a:solidFill>
-                  <a:srgbClr val="333333"/>
-                </a:solidFill>
-                <a:latin typeface="Lekton"/>
-              </a:rPr>
-              <a:t>Prison overcrowding is concentrated in Southern and Central Europe, not uniformly distributed. Northern European countries successfully maintain capacity well below 100%, suggesting policy/system differences.</a:t>
+              <a:rPr lang="en-US" sz="1000" dirty="0">
+                <a:solidFill>
+                  <a:srgbClr val="333333"/>
+                </a:solidFill>
+                <a:latin typeface="Lekton"/>
+              </a:rPr>
+              <a:t>Liechtenstein: Extreme volatility (265% → 360% → 218%), unmanageable swings</a:t>
+            </a:r>
+          </a:p>
+          <a:p>
+            <a:pPr algn="l">
+              <a:buNone/>
+            </a:pPr>
+            <a:r>
+              <a:rPr lang="en-US" sz="1000" dirty="0">
+                <a:solidFill>
+                  <a:srgbClr val="333333"/>
+                </a:solidFill>
+                <a:latin typeface="Lekton"/>
+              </a:rPr>
+              <a:t>Italy: Consistent upward trend (90% → 119%), worsening crisis</a:t>
+            </a:r>
+          </a:p>
+          <a:p>
+            <a:pPr algn="l">
+              <a:buNone/>
+            </a:pPr>
+            <a:r>
+              <a:rPr lang="en-US" sz="1000" dirty="0">
+                <a:solidFill>
+                  <a:srgbClr val="333333"/>
+                </a:solidFill>
+                <a:latin typeface="Lekton"/>
+              </a:rPr>
+              <a:t>France: Stable overcrowding (120–125%), persistent problem</a:t>
+            </a:r>
+          </a:p>
+          <a:p>
+            <a:pPr algn="l">
+              <a:buNone/>
+            </a:pPr>
+            <a:r>
+              <a:rPr lang="en-US" sz="1000" dirty="0">
+                <a:solidFill>
+                  <a:srgbClr val="333333"/>
+                </a:solidFill>
+                <a:latin typeface="Lekton"/>
+              </a:rPr>
+              <a:t>Belgium: Slight improvement (115% → 113%), but still overcrowded</a:t>
+            </a:r>
+          </a:p>
+          <a:p>
+            <a:pPr algn="l">
+              <a:buNone/>
+            </a:pPr>
+            <a:r>
+              <a:rPr lang="en-US" sz="1000" dirty="0">
+                <a:solidFill>
+                  <a:srgbClr val="333333"/>
+                </a:solidFill>
+                <a:latin typeface="Lekton"/>
+              </a:rPr>
+              <a:t>Sweden: Volatile but recent improvement (112% → 107%), positive trajectory</a:t>
+            </a:r>
+          </a:p>
+          <a:p>
+            <a:pPr algn="l">
+              <a:buNone/>
+            </a:pPr>
+            <a:r>
+              <a:rPr lang="en-US" sz="1000" dirty="0">
+                <a:solidFill>
+                  <a:srgbClr val="333333"/>
+                </a:solidFill>
+                <a:latin typeface="Lekton"/>
+              </a:rPr>
+              <a:t>EU average: Stable around 95%, slight downward trend (good management overall)</a:t>
+            </a:r>
+          </a:p>
+          <a:p>
+            <a:pPr algn="l">
+              <a:buNone/>
+            </a:pPr>
+            <a:r>
+              <a:rPr lang="en-US" sz="1000" dirty="0">
+                <a:solidFill>
+                  <a:srgbClr val="333333"/>
+                </a:solidFill>
+                <a:latin typeface="Lekton"/>
+              </a:rPr>
+              <a:t>Key insights</a:t>
+            </a:r>
+          </a:p>
+          <a:p>
+            <a:pPr algn="l">
+              <a:buNone/>
+            </a:pPr>
+            <a:r>
+              <a:rPr lang="en-US" sz="1000" dirty="0">
+                <a:solidFill>
+                  <a:srgbClr val="333333"/>
+                </a:solidFill>
+                <a:latin typeface="Lekton"/>
+              </a:rPr>
+              <a:t>Italy's problem is worsening, not improving (straight +29pp line)</a:t>
+            </a:r>
+          </a:p>
+          <a:p>
+            <a:pPr algn="l">
+              <a:buNone/>
+            </a:pPr>
+            <a:r>
+              <a:rPr lang="en-US" sz="1000" dirty="0">
+                <a:solidFill>
+                  <a:srgbClr val="333333"/>
+                </a:solidFill>
+                <a:latin typeface="Lekton"/>
+              </a:rPr>
+              <a:t>Liechtenstein is uncontrollable (likely administrative/immigration issues)</a:t>
+            </a:r>
+          </a:p>
+          <a:p>
+            <a:pPr algn="l">
+              <a:buNone/>
+            </a:pPr>
+            <a:r>
+              <a:rPr lang="en-US" sz="1000" dirty="0">
+                <a:solidFill>
+                  <a:srgbClr val="333333"/>
+                </a:solidFill>
+                <a:latin typeface="Lekton"/>
+              </a:rPr>
+              <a:t>Northern countries do better (Sweden improving; EU avg stable)</a:t>
+            </a:r>
+          </a:p>
+          <a:p>
+            <a:pPr algn="l">
+              <a:buNone/>
+            </a:pPr>
+            <a:r>
+              <a:rPr lang="en-US" sz="1000" dirty="0">
+                <a:solidFill>
+                  <a:srgbClr val="333333"/>
+                </a:solidFill>
+                <a:latin typeface="Lekton"/>
+              </a:rPr>
+              <a:t>10-year horizon: Overcrowding is NOT temporary; it's structural in Southern Europe</a:t>
             </a:r>
           </a:p>
         </p:txBody>
       </p:sp>
-      <p:sp>
-        <p:nvSpPr>
-          <p:cNvPr id="6" name="Rettangolo 5">
-            <a:extLst>
-              <a:ext uri="{FF2B5EF4-FFF2-40B4-BE49-F238E27FC236}">
-                <a16:creationId xmlns:a16="http://schemas.microsoft.com/office/drawing/2014/main" id="{BB7AC9C1-FC0B-428B-B8CB-C91A6F5CFFB1}"/>
-              </a:ext>
-            </a:extLst>
-          </p:cNvPr>
-          <p:cNvSpPr/>
-          <p:nvPr/>
-        </p:nvSpPr>
-        <p:spPr>
-          <a:xfrm>
-            <a:off x="3897961" y="4457700"/>
-            <a:ext cx="258298" cy="174811"/>
-          </a:xfrm>
-          <a:prstGeom prst="rect">
-            <a:avLst/>
-          </a:prstGeom>
-          <a:solidFill>
-            <a:schemeClr val="bg1"/>
-          </a:solidFill>
-          <a:ln>
-            <a:solidFill>
-              <a:schemeClr val="bg1"/>
-            </a:solidFill>
-          </a:ln>
-        </p:spPr>
-        <p:style>
-          <a:lnRef idx="2">
-            <a:schemeClr val="accent1">
-              <a:shade val="50000"/>
-            </a:schemeClr>
-          </a:lnRef>
-          <a:fillRef idx="1">
-            <a:schemeClr val="accent1"/>
-          </a:fillRef>
-          <a:effectRef idx="0">
-            <a:schemeClr val="accent1"/>
-          </a:effectRef>
-          <a:fontRef idx="minor">
-            <a:schemeClr val="lt1"/>
-          </a:fontRef>
-        </p:style>
-        <p:txBody>
-          <a:bodyPr rtlCol="0" anchor="ctr"/>
-          <a:lstStyle/>
-          <a:p>
-            <a:pPr algn="ctr"/>
-            <a:endParaRPr lang="it-IT">
-              <a:ln>
-                <a:solidFill>
-                  <a:schemeClr val="bg1"/>
-                </a:solidFill>
-              </a:ln>
-              <a:solidFill>
-                <a:schemeClr val="bg1"/>
-              </a:solidFill>
-            </a:endParaRPr>
-          </a:p>
-        </p:txBody>
-      </p:sp>
-      <p:pic>
-        <p:nvPicPr>
-          <p:cNvPr id="7" name="Immagine 6">
-            <a:extLst>
-              <a:ext uri="{FF2B5EF4-FFF2-40B4-BE49-F238E27FC236}">
-                <a16:creationId xmlns:a16="http://schemas.microsoft.com/office/drawing/2014/main" id="{87C1D17E-345D-4767-B445-5EAEFE07080D}"/>
-              </a:ext>
-            </a:extLst>
-          </p:cNvPr>
-          <p:cNvPicPr>
-            <a:picLocks noChangeAspect="1"/>
-          </p:cNvPicPr>
-          <p:nvPr/>
-        </p:nvPicPr>
-        <p:blipFill>
-          <a:blip r:embed="rId3"/>
-          <a:stretch>
-            <a:fillRect/>
-          </a:stretch>
-        </p:blipFill>
-        <p:spPr>
-          <a:xfrm>
-            <a:off x="85110" y="0"/>
-            <a:ext cx="2225507" cy="2649071"/>
-          </a:xfrm>
-          <a:prstGeom prst="rect">
-            <a:avLst/>
-          </a:prstGeom>
-        </p:spPr>
-      </p:pic>
-      <p:pic>
-        <p:nvPicPr>
-          <p:cNvPr id="9" name="Immagine 8">
-            <a:extLst>
-              <a:ext uri="{FF2B5EF4-FFF2-40B4-BE49-F238E27FC236}">
-                <a16:creationId xmlns:a16="http://schemas.microsoft.com/office/drawing/2014/main" id="{B08EB941-82B4-42A9-997D-87522050325D}"/>
-              </a:ext>
-            </a:extLst>
-          </p:cNvPr>
-          <p:cNvPicPr>
-            <a:picLocks noChangeAspect="1"/>
-          </p:cNvPicPr>
-          <p:nvPr/>
-        </p:nvPicPr>
-        <p:blipFill>
-          <a:blip r:embed="rId4"/>
-          <a:stretch>
-            <a:fillRect/>
-          </a:stretch>
-        </p:blipFill>
-        <p:spPr>
-          <a:xfrm>
-            <a:off x="0" y="2649071"/>
-            <a:ext cx="3421593" cy="2488933"/>
-          </a:xfrm>
-          <a:prstGeom prst="rect">
-            <a:avLst/>
-          </a:prstGeom>
-        </p:spPr>
-      </p:pic>
     </p:spTree>
     <p:extLst>
       <p:ext uri="{BB962C8B-B14F-4D97-AF65-F5344CB8AC3E}">
-        <p14:creationId xmlns:p14="http://schemas.microsoft.com/office/powerpoint/2010/main" val="1804647404"/>
+        <p14:creationId xmlns:p14="http://schemas.microsoft.com/office/powerpoint/2010/main" val="3712875230"/>
       </p:ext>
     </p:extLst>
   </p:cSld>
@@ -14718,10 +14722,344 @@
                 <a:cs typeface="Lekton"/>
                 <a:sym typeface="Lekton"/>
               </a:rPr>
-              <a:t>Prison Occupancy Trends 2014-2022: European countries with prison occupancy &lt; 1000 (</a:t>
-            </a:r>
-            <a:r>
-              <a:rPr lang="en-US" sz="1800" b="1" dirty="0" err="1">
+              <a:t>What are the regional differences (North vs South Europe) in prison overcrowding?</a:t>
+            </a:r>
+          </a:p>
+        </p:txBody>
+      </p:sp>
+      <p:sp>
+        <p:nvSpPr>
+          <p:cNvPr id="8" name="TextBox 7">
+            <a:extLst>
+              <a:ext uri="{FF2B5EF4-FFF2-40B4-BE49-F238E27FC236}">
+                <a16:creationId xmlns:a16="http://schemas.microsoft.com/office/drawing/2014/main" id="{4B15ACC2-9BD0-A397-E2B5-AA9B98489E73}"/>
+              </a:ext>
+            </a:extLst>
+          </p:cNvPr>
+          <p:cNvSpPr txBox="1"/>
+          <p:nvPr/>
+        </p:nvSpPr>
+        <p:spPr>
+          <a:xfrm>
+            <a:off x="4572000" y="1171539"/>
+            <a:ext cx="4630421" cy="3631763"/>
+          </a:xfrm>
+          <a:prstGeom prst="rect">
+            <a:avLst/>
+          </a:prstGeom>
+          <a:noFill/>
+        </p:spPr>
+        <p:txBody>
+          <a:bodyPr wrap="square">
+            <a:spAutoFit/>
+          </a:bodyPr>
+          <a:lstStyle/>
+          <a:p>
+            <a:pPr algn="l">
+              <a:buNone/>
+            </a:pPr>
+            <a:r>
+              <a:rPr lang="en-US" sz="1000" dirty="0">
+                <a:solidFill>
+                  <a:srgbClr val="333333"/>
+                </a:solidFill>
+                <a:latin typeface="Lekton"/>
+              </a:rPr>
+              <a:t>Visual Description</a:t>
+            </a:r>
+          </a:p>
+          <a:p>
+            <a:pPr algn="l">
+              <a:buNone/>
+            </a:pPr>
+            <a:r>
+              <a:rPr lang="en-US" sz="1000" dirty="0">
+                <a:solidFill>
+                  <a:srgbClr val="333333"/>
+                </a:solidFill>
+                <a:latin typeface="Lekton"/>
+              </a:rPr>
+              <a:t>Time series line chart (2014–2023) showing occupancy rate evolution for:</a:t>
+            </a:r>
+          </a:p>
+          <a:p>
+            <a:pPr algn="l">
+              <a:buNone/>
+            </a:pPr>
+            <a:r>
+              <a:rPr lang="en-US" sz="1000" dirty="0">
+                <a:solidFill>
+                  <a:srgbClr val="333333"/>
+                </a:solidFill>
+                <a:latin typeface="Lekton"/>
+              </a:rPr>
+              <a:t>Italy, France, Belgium, Liechtenstein, Sweden</a:t>
+            </a:r>
+          </a:p>
+          <a:p>
+            <a:pPr algn="l">
+              <a:buNone/>
+            </a:pPr>
+            <a:r>
+              <a:rPr lang="en-US" sz="1000" dirty="0">
+                <a:solidFill>
+                  <a:srgbClr val="333333"/>
+                </a:solidFill>
+                <a:latin typeface="Lekton"/>
+              </a:rPr>
+              <a:t>EU27 average (reference baseline)</a:t>
+            </a:r>
+          </a:p>
+          <a:p>
+            <a:pPr algn="l">
+              <a:buNone/>
+            </a:pPr>
+            <a:r>
+              <a:rPr lang="en-US" sz="1000" dirty="0">
+                <a:solidFill>
+                  <a:srgbClr val="333333"/>
+                </a:solidFill>
+                <a:latin typeface="Lekton"/>
+              </a:rPr>
+              <a:t>Red dashed line at 100%: overcrowding threshold</a:t>
+            </a:r>
+          </a:p>
+          <a:p>
+            <a:pPr algn="l">
+              <a:buNone/>
+            </a:pPr>
+            <a:r>
+              <a:rPr lang="en-US" sz="1000" dirty="0">
+                <a:solidFill>
+                  <a:srgbClr val="333333"/>
+                </a:solidFill>
+                <a:latin typeface="Lekton"/>
+              </a:rPr>
+              <a:t>What the chart shows</a:t>
+            </a:r>
+          </a:p>
+          <a:p>
+            <a:pPr algn="l">
+              <a:buNone/>
+            </a:pPr>
+            <a:r>
+              <a:rPr lang="en-US" sz="1000" dirty="0">
+                <a:solidFill>
+                  <a:srgbClr val="333333"/>
+                </a:solidFill>
+                <a:latin typeface="Lekton"/>
+              </a:rPr>
+              <a:t>Liechtenstein: Extreme volatility (265% → 360% → 218%), unmanageable swings</a:t>
+            </a:r>
+          </a:p>
+          <a:p>
+            <a:pPr algn="l">
+              <a:buNone/>
+            </a:pPr>
+            <a:r>
+              <a:rPr lang="en-US" sz="1000" dirty="0">
+                <a:solidFill>
+                  <a:srgbClr val="333333"/>
+                </a:solidFill>
+                <a:latin typeface="Lekton"/>
+              </a:rPr>
+              <a:t>Italy: Consistent upward trend (90% → 119%), worsening crisis</a:t>
+            </a:r>
+          </a:p>
+          <a:p>
+            <a:pPr algn="l">
+              <a:buNone/>
+            </a:pPr>
+            <a:r>
+              <a:rPr lang="en-US" sz="1000" dirty="0">
+                <a:solidFill>
+                  <a:srgbClr val="333333"/>
+                </a:solidFill>
+                <a:latin typeface="Lekton"/>
+              </a:rPr>
+              <a:t>France: Stable overcrowding (120–125%), persistent problem</a:t>
+            </a:r>
+          </a:p>
+          <a:p>
+            <a:pPr algn="l">
+              <a:buNone/>
+            </a:pPr>
+            <a:r>
+              <a:rPr lang="en-US" sz="1000" dirty="0">
+                <a:solidFill>
+                  <a:srgbClr val="333333"/>
+                </a:solidFill>
+                <a:latin typeface="Lekton"/>
+              </a:rPr>
+              <a:t>Belgium: Slight improvement (115% → 113%), but still overcrowded</a:t>
+            </a:r>
+          </a:p>
+          <a:p>
+            <a:pPr algn="l">
+              <a:buNone/>
+            </a:pPr>
+            <a:r>
+              <a:rPr lang="en-US" sz="1000" dirty="0">
+                <a:solidFill>
+                  <a:srgbClr val="333333"/>
+                </a:solidFill>
+                <a:latin typeface="Lekton"/>
+              </a:rPr>
+              <a:t>Sweden: Volatile but recent improvement (112% → 107%), positive trajectory</a:t>
+            </a:r>
+          </a:p>
+          <a:p>
+            <a:pPr algn="l">
+              <a:buNone/>
+            </a:pPr>
+            <a:r>
+              <a:rPr lang="en-US" sz="1000" dirty="0">
+                <a:solidFill>
+                  <a:srgbClr val="333333"/>
+                </a:solidFill>
+                <a:latin typeface="Lekton"/>
+              </a:rPr>
+              <a:t>EU average: Stable around 95%, slight downward trend (good management overall)</a:t>
+            </a:r>
+          </a:p>
+          <a:p>
+            <a:pPr algn="l">
+              <a:buNone/>
+            </a:pPr>
+            <a:r>
+              <a:rPr lang="en-US" sz="1000" dirty="0">
+                <a:solidFill>
+                  <a:srgbClr val="333333"/>
+                </a:solidFill>
+                <a:latin typeface="Lekton"/>
+              </a:rPr>
+              <a:t>Key insights</a:t>
+            </a:r>
+          </a:p>
+          <a:p>
+            <a:pPr algn="l">
+              <a:buNone/>
+            </a:pPr>
+            <a:r>
+              <a:rPr lang="en-US" sz="1000" dirty="0">
+                <a:solidFill>
+                  <a:srgbClr val="333333"/>
+                </a:solidFill>
+                <a:latin typeface="Lekton"/>
+              </a:rPr>
+              <a:t>Italy's problem is worsening, not improving (straight +29pp line)</a:t>
+            </a:r>
+          </a:p>
+          <a:p>
+            <a:pPr algn="l">
+              <a:buNone/>
+            </a:pPr>
+            <a:r>
+              <a:rPr lang="en-US" sz="1000" dirty="0">
+                <a:solidFill>
+                  <a:srgbClr val="333333"/>
+                </a:solidFill>
+                <a:latin typeface="Lekton"/>
+              </a:rPr>
+              <a:t>Liechtenstein is uncontrollable (likely administrative/immigration issues)</a:t>
+            </a:r>
+          </a:p>
+          <a:p>
+            <a:pPr algn="l">
+              <a:buNone/>
+            </a:pPr>
+            <a:r>
+              <a:rPr lang="en-US" sz="1000" dirty="0">
+                <a:solidFill>
+                  <a:srgbClr val="333333"/>
+                </a:solidFill>
+                <a:latin typeface="Lekton"/>
+              </a:rPr>
+              <a:t>Northern countries do better (Sweden improving; EU avg stable)</a:t>
+            </a:r>
+          </a:p>
+          <a:p>
+            <a:pPr algn="l">
+              <a:buNone/>
+            </a:pPr>
+            <a:r>
+              <a:rPr lang="en-US" sz="1000" dirty="0">
+                <a:solidFill>
+                  <a:srgbClr val="333333"/>
+                </a:solidFill>
+                <a:latin typeface="Lekton"/>
+              </a:rPr>
+              <a:t>10-year horizon: Overcrowding is NOT temporary; it's structural in Southern Europe</a:t>
+            </a:r>
+          </a:p>
+        </p:txBody>
+      </p:sp>
+    </p:spTree>
+    <p:extLst>
+      <p:ext uri="{BB962C8B-B14F-4D97-AF65-F5344CB8AC3E}">
+        <p14:creationId xmlns:p14="http://schemas.microsoft.com/office/powerpoint/2010/main" val="587155880"/>
+      </p:ext>
+    </p:extLst>
+  </p:cSld>
+  <p:clrMapOvr>
+    <a:masterClrMapping/>
+  </p:clrMapOvr>
+</p:sld>
+</file>
+
+<file path=ppt/slides/slide15.xml><?xml version="1.0" encoding="utf-8"?>
+<p:sld xmlns:a="http://schemas.openxmlformats.org/drawingml/2006/main" xmlns:r="http://schemas.openxmlformats.org/officeDocument/2006/relationships" xmlns:p="http://schemas.openxmlformats.org/presentationml/2006/main">
+  <p:cSld>
+    <p:spTree>
+      <p:nvGrpSpPr>
+        <p:cNvPr id="1" name="Shape 179"/>
+        <p:cNvGrpSpPr/>
+        <p:nvPr/>
+      </p:nvGrpSpPr>
+      <p:grpSpPr>
+        <a:xfrm>
+          <a:off x="0" y="0"/>
+          <a:ext cx="0" cy="0"/>
+          <a:chOff x="0" y="0"/>
+          <a:chExt cx="0" cy="0"/>
+        </a:xfrm>
+      </p:grpSpPr>
+      <p:sp>
+        <p:nvSpPr>
+          <p:cNvPr id="180" name="Google Shape;180;p34"/>
+          <p:cNvSpPr txBox="1"/>
+          <p:nvPr/>
+        </p:nvSpPr>
+        <p:spPr>
+          <a:xfrm>
+            <a:off x="567000" y="111350"/>
+            <a:ext cx="8010000" cy="476100"/>
+          </a:xfrm>
+          <a:prstGeom prst="rect">
+            <a:avLst/>
+          </a:prstGeom>
+          <a:noFill/>
+          <a:ln>
+            <a:noFill/>
+          </a:ln>
+        </p:spPr>
+        <p:txBody>
+          <a:bodyPr spcFirstLastPara="1" wrap="square" lIns="0" tIns="0" rIns="0" bIns="0" anchor="t" anchorCtr="0">
+            <a:noAutofit/>
+          </a:bodyPr>
+          <a:lstStyle/>
+          <a:p>
+            <a:pPr lvl="0" algn="ctr">
+              <a:spcBef>
+                <a:spcPts val="1000"/>
+              </a:spcBef>
+              <a:buClr>
+                <a:schemeClr val="dk1"/>
+              </a:buClr>
+              <a:buSzPts val="1100"/>
+            </a:pPr>
+            <a:r>
+              <a:rPr lang="en-US" sz="1800" b="1" dirty="0">
                 <a:solidFill>
                   <a:srgbClr val="D66B55"/>
                 </a:solidFill>
@@ -14730,19 +15068,7 @@
                 <a:cs typeface="Lekton"/>
                 <a:sym typeface="Lekton"/>
               </a:rPr>
-              <a:t>Plotly</a:t>
-            </a:r>
-            <a:r>
-              <a:rPr lang="en-US" sz="1800" b="1" dirty="0">
-                <a:solidFill>
-                  <a:srgbClr val="D66B55"/>
-                </a:solidFill>
-                <a:latin typeface="Lekton"/>
-                <a:ea typeface="Lekton"/>
-                <a:cs typeface="Lekton"/>
-                <a:sym typeface="Lekton"/>
-              </a:rPr>
-              <a:t> Line Chart)</a:t>
+              <a:t>Prison Occupancy Trends 2014-2022: European countries with prison occupancy &lt; 1000</a:t>
             </a:r>
             <a:endParaRPr sz="1800" b="1" dirty="0">
               <a:solidFill>
@@ -15061,7 +15387,7 @@
 </p:sld>
 </file>
 
-<file path=ppt/slides/slide15.xml><?xml version="1.0" encoding="utf-8"?>
+<file path=ppt/slides/slide16.xml><?xml version="1.0" encoding="utf-8"?>
 <p:sld xmlns:a="http://schemas.openxmlformats.org/drawingml/2006/main" xmlns:r="http://schemas.openxmlformats.org/officeDocument/2006/relationships" xmlns:p="http://schemas.openxmlformats.org/presentationml/2006/main">
   <p:cSld>
     <p:spTree>
@@ -15538,7 +15864,7 @@
 </p:sld>
 </file>
 
-<file path=ppt/slides/slide16.xml><?xml version="1.0" encoding="utf-8"?>
+<file path=ppt/slides/slide17.xml><?xml version="1.0" encoding="utf-8"?>
 <p:sld xmlns:a="http://schemas.openxmlformats.org/drawingml/2006/main" xmlns:r="http://schemas.openxmlformats.org/officeDocument/2006/relationships" xmlns:p="http://schemas.openxmlformats.org/presentationml/2006/main">
   <p:cSld>
     <p:spTree>
@@ -15965,7 +16291,7 @@
                 <a:cs typeface="Lekton"/>
                 <a:sym typeface="Lekton"/>
               </a:rPr>
-              <a:t>Which countries have been most successful in keeping occupancy below capacity in the 2023?</a:t>
+              <a:t>Which countries have been most successful in keeping occupancy below capacity in the 2022?</a:t>
             </a:r>
           </a:p>
           <a:p>
@@ -16006,14 +16332,14 @@
             <a:r>
               <a:rPr lang="en-US" dirty="0">
                 <a:solidFill>
-                  <a:srgbClr val="333333"/>
-                </a:solidFill>
-                <a:latin typeface="Lekton"/>
-                <a:ea typeface="Lekton"/>
-                <a:cs typeface="Lekton"/>
-                <a:sym typeface="Lekton"/>
-              </a:rPr>
-              <a:t>Are their trends improving, stable, or worsening over the 2014–2023 period, compared to the overall European average?</a:t>
+                  <a:srgbClr val="FF0000"/>
+                </a:solidFill>
+                <a:latin typeface="Lekton"/>
+                <a:ea typeface="Lekton"/>
+                <a:cs typeface="Lekton"/>
+                <a:sym typeface="Lekton"/>
+              </a:rPr>
+              <a:t>Are their trends improving, stable, or worsening over the 2014–2022 period, compared to the overall European average?</a:t>
             </a:r>
           </a:p>
           <a:p>
@@ -16030,66 +16356,14 @@
             <a:r>
               <a:rPr lang="en-US" dirty="0">
                 <a:solidFill>
-                  <a:srgbClr val="333333"/>
-                </a:solidFill>
-                <a:latin typeface="Lekton"/>
-                <a:ea typeface="Lekton"/>
-                <a:cs typeface="Lekton"/>
-                <a:sym typeface="Lekton"/>
-              </a:rPr>
-              <a:t>How has Italy's prison occupancy evolved from 2014–2023</a:t>
-            </a:r>
-          </a:p>
-        </p:txBody>
-      </p:sp>
-      <p:sp>
-        <p:nvSpPr>
-          <p:cNvPr id="2" name="Rettangolo 1">
-            <a:extLst>
-              <a:ext uri="{FF2B5EF4-FFF2-40B4-BE49-F238E27FC236}">
-                <a16:creationId xmlns:a16="http://schemas.microsoft.com/office/drawing/2014/main" id="{AD259969-414F-4AFA-9251-A32540D86102}"/>
-              </a:ext>
-            </a:extLst>
-          </p:cNvPr>
-          <p:cNvSpPr/>
-          <p:nvPr/>
-        </p:nvSpPr>
-        <p:spPr>
-          <a:xfrm>
-            <a:off x="2286000" y="2277824"/>
-            <a:ext cx="4572000" cy="587853"/>
-          </a:xfrm>
-          <a:prstGeom prst="rect">
-            <a:avLst/>
-          </a:prstGeom>
-        </p:spPr>
-        <p:txBody>
-          <a:bodyPr>
-            <a:spAutoFit/>
-          </a:bodyPr>
-          <a:lstStyle/>
-          <a:p>
-            <a:pPr marL="285750" lvl="8" indent="-285750">
-              <a:lnSpc>
-                <a:spcPct val="115000"/>
-              </a:lnSpc>
-              <a:spcBef>
-                <a:spcPts val="1000"/>
-              </a:spcBef>
-              <a:buFont typeface="Arial" panose="020B0604020202020204" pitchFamily="34" charset="0"/>
-              <a:buChar char="•"/>
-            </a:pPr>
-            <a:r>
-              <a:rPr lang="en-US" dirty="0">
-                <a:solidFill>
-                  <a:srgbClr val="333333"/>
-                </a:solidFill>
-                <a:latin typeface="Lekton"/>
-                <a:ea typeface="Lekton"/>
-                <a:cs typeface="Lekton"/>
-                <a:sym typeface="Lekton"/>
-              </a:rPr>
-              <a:t>How many European countries exceed 100% prison occupancy rate in the 2022?</a:t>
+                  <a:srgbClr val="FF0000"/>
+                </a:solidFill>
+                <a:latin typeface="Lekton"/>
+                <a:ea typeface="Lekton"/>
+                <a:cs typeface="Lekton"/>
+                <a:sym typeface="Lekton"/>
+              </a:rPr>
+              <a:t>How has Italy's prison occupancy evolved from 2014–2022</a:t>
             </a:r>
           </a:p>
         </p:txBody>
@@ -16176,29 +16450,6 @@
               </a:spcAft>
               <a:buNone/>
             </a:pPr>
-            <a:r>
-              <a:rPr lang="en-US" i="1" dirty="0">
-                <a:solidFill>
-                  <a:srgbClr val="333333"/>
-                </a:solidFill>
-                <a:latin typeface="Lekton"/>
-                <a:ea typeface="Lekton"/>
-                <a:cs typeface="Lekton"/>
-                <a:sym typeface="Lekton"/>
-              </a:rPr>
-              <a:t>Dataset Chosen</a:t>
-            </a:r>
-          </a:p>
-          <a:p>
-            <a:pPr marL="0" lvl="0" indent="0" algn="l" rtl="0">
-              <a:spcBef>
-                <a:spcPts val="1000"/>
-              </a:spcBef>
-              <a:spcAft>
-                <a:spcPts val="0"/>
-              </a:spcAft>
-              <a:buNone/>
-            </a:pPr>
             <a:endParaRPr lang="en-US" i="1" dirty="0">
               <a:solidFill>
                 <a:srgbClr val="333333"/>
@@ -16220,6 +16471,29 @@
               <a:buNone/>
             </a:pPr>
             <a:r>
+              <a:rPr lang="en-US" b="1" i="1" dirty="0">
+                <a:solidFill>
+                  <a:srgbClr val="333333"/>
+                </a:solidFill>
+                <a:latin typeface="Lekton"/>
+                <a:ea typeface="Lekton"/>
+                <a:cs typeface="Lekton"/>
+                <a:sym typeface="Lekton"/>
+              </a:rPr>
+              <a:t>Dataset: </a:t>
+            </a:r>
+          </a:p>
+          <a:p>
+            <a:pPr marL="0" lvl="0" indent="0" algn="l" rtl="0">
+              <a:spcBef>
+                <a:spcPts val="1000"/>
+              </a:spcBef>
+              <a:spcAft>
+                <a:spcPts val="0"/>
+              </a:spcAft>
+              <a:buNone/>
+            </a:pPr>
+            <a:r>
               <a:rPr lang="en-US" i="1" dirty="0">
                 <a:solidFill>
                   <a:srgbClr val="333333"/>
@@ -16229,7 +16503,7 @@
                 <a:cs typeface="Lekton"/>
                 <a:sym typeface="Lekton"/>
               </a:rPr>
-              <a:t>Eurostat: Prison capacity and number of persons held (</a:t>
+              <a:t>Eurostat Prison capacity and number of persons held (</a:t>
             </a:r>
             <a:r>
               <a:rPr lang="en-US" i="1" dirty="0" err="1">
@@ -16240,8 +16514,22 @@
                 <a:ea typeface="Lekton"/>
                 <a:cs typeface="Lekton"/>
                 <a:sym typeface="Lekton"/>
-              </a:rPr>
-              <a:t>crim_pris_cap</a:t>
+                <a:hlinkClick r:id="rId3"/>
+              </a:rPr>
+              <a:t>e</a:t>
+            </a:r>
+            <a:r>
+              <a:rPr lang="en-US" i="1" dirty="0" err="1">
+                <a:solidFill>
+                  <a:srgbClr val="333333"/>
+                </a:solidFill>
+                <a:latin typeface="Lekton"/>
+                <a:ea typeface="Lekton"/>
+                <a:cs typeface="Lekton"/>
+                <a:sym typeface="Lekton"/>
+                <a:hlinkClick r:id="rId3"/>
+              </a:rPr>
+              <a:t>urostat</a:t>
             </a:r>
             <a:r>
               <a:rPr lang="en-US" i="1" dirty="0">
@@ -16276,7 +16564,7 @@
                 <a:cs typeface="Lekton"/>
                 <a:sym typeface="Lekton"/>
               </a:rPr>
-              <a:t>Source: https://ec.europa.eu/eurostat/databrowser/view/crim_pris_cap/default/table?lang=en</a:t>
+              <a:t>Temporal coverage: 2014–2022 (9 years)</a:t>
             </a:r>
           </a:p>
           <a:p>
@@ -16299,7 +16587,7 @@
                 <a:cs typeface="Lekton"/>
                 <a:sym typeface="Lekton"/>
               </a:rPr>
-              <a:t>License: EU Open Data Portal (free for non-commercial use, including academic research)</a:t>
+              <a:t>Geographic scope: 37 European countries (EU27 + Balkans + Nordic countries)</a:t>
             </a:r>
           </a:p>
           <a:p>
@@ -16313,6 +16601,29 @@
               <a:buNone/>
             </a:pPr>
             <a:r>
+              <a:rPr lang="en-US" b="1" i="1" dirty="0">
+                <a:solidFill>
+                  <a:srgbClr val="333333"/>
+                </a:solidFill>
+                <a:latin typeface="Lekton"/>
+                <a:ea typeface="Lekton"/>
+                <a:cs typeface="Lekton"/>
+                <a:sym typeface="Lekton"/>
+              </a:rPr>
+              <a:t>Data Composition:</a:t>
+            </a:r>
+          </a:p>
+          <a:p>
+            <a:pPr marL="0" lvl="0" indent="0" algn="l" rtl="0">
+              <a:spcBef>
+                <a:spcPts val="1000"/>
+              </a:spcBef>
+              <a:spcAft>
+                <a:spcPts val="0"/>
+              </a:spcAft>
+              <a:buNone/>
+            </a:pPr>
+            <a:r>
               <a:rPr lang="en-US" i="1" dirty="0">
                 <a:solidFill>
                   <a:srgbClr val="333333"/>
@@ -16322,7 +16633,7 @@
                 <a:cs typeface="Lekton"/>
                 <a:sym typeface="Lekton"/>
               </a:rPr>
-              <a:t>Temporal coverage: 2014–2023 (10 years)</a:t>
+              <a:t>Total records: 1,454 observations</a:t>
             </a:r>
           </a:p>
           <a:p>
@@ -16336,76 +16647,7 @@
               <a:buNone/>
             </a:pPr>
             <a:r>
-              <a:rPr lang="en-US" i="1" dirty="0">
-                <a:solidFill>
-                  <a:srgbClr val="333333"/>
-                </a:solidFill>
-                <a:latin typeface="Lekton"/>
-                <a:ea typeface="Lekton"/>
-                <a:cs typeface="Lekton"/>
-                <a:sym typeface="Lekton"/>
-              </a:rPr>
-              <a:t>Geographic scope: 37 European countries (EU27 + Balkans + Nordic countries)</a:t>
-            </a:r>
-          </a:p>
-          <a:p>
-            <a:pPr marL="0" lvl="0" indent="0" algn="l" rtl="0">
-              <a:spcBef>
-                <a:spcPts val="1000"/>
-              </a:spcBef>
-              <a:spcAft>
-                <a:spcPts val="0"/>
-              </a:spcAft>
-              <a:buNone/>
-            </a:pPr>
-            <a:r>
-              <a:rPr lang="en-US" i="1" dirty="0">
-                <a:solidFill>
-                  <a:srgbClr val="333333"/>
-                </a:solidFill>
-                <a:latin typeface="Lekton"/>
-                <a:ea typeface="Lekton"/>
-                <a:cs typeface="Lekton"/>
-                <a:sym typeface="Lekton"/>
-              </a:rPr>
-              <a:t>Data Composition</a:t>
-            </a:r>
-          </a:p>
-          <a:p>
-            <a:pPr marL="0" lvl="0" indent="0" algn="l" rtl="0">
-              <a:spcBef>
-                <a:spcPts val="1000"/>
-              </a:spcBef>
-              <a:spcAft>
-                <a:spcPts val="0"/>
-              </a:spcAft>
-              <a:buNone/>
-            </a:pPr>
-            <a:r>
-              <a:rPr lang="en-US" i="1" dirty="0">
-                <a:solidFill>
-                  <a:srgbClr val="333333"/>
-                </a:solidFill>
-                <a:latin typeface="Lekton"/>
-                <a:ea typeface="Lekton"/>
-                <a:cs typeface="Lekton"/>
-                <a:sym typeface="Lekton"/>
-              </a:rPr>
-              <a:t>Total records: 1,454 observations</a:t>
-            </a:r>
-          </a:p>
-          <a:p>
-            <a:pPr marL="0" lvl="0" indent="0" algn="l" rtl="0">
-              <a:spcBef>
-                <a:spcPts val="1000"/>
-              </a:spcBef>
-              <a:spcAft>
-                <a:spcPts val="0"/>
-              </a:spcAft>
-              <a:buNone/>
-            </a:pPr>
-            <a:r>
-              <a:rPr lang="en-US" i="1" dirty="0">
+              <a:rPr lang="en-US" b="1" i="1" dirty="0">
                 <a:solidFill>
                   <a:srgbClr val="333333"/>
                 </a:solidFill>

</xml_diff>